<commit_message>
Application structure diagram added
</commit_message>
<xml_diff>
--- a/Documentation/Pitch.pptx
+++ b/Documentation/Pitch.pptx
@@ -313,7 +313,7 @@
           <a:p>
             <a:fld id="{6D7BF124-89DF-4EBC-BCA2-D0D0B8B9CCE7}" type="datetimeFigureOut">
               <a:rPr lang="ru-RU" smtClean="0"/>
-              <a:t>21.01.2022</a:t>
+              <a:t>26.01.2022</a:t>
             </a:fld>
             <a:endParaRPr lang="ru-RU"/>
           </a:p>
@@ -541,7 +541,7 @@
           <a:p>
             <a:fld id="{6D7BF124-89DF-4EBC-BCA2-D0D0B8B9CCE7}" type="datetimeFigureOut">
               <a:rPr lang="ru-RU" smtClean="0"/>
-              <a:t>21.01.2022</a:t>
+              <a:t>26.01.2022</a:t>
             </a:fld>
             <a:endParaRPr lang="ru-RU"/>
           </a:p>
@@ -721,7 +721,7 @@
           <a:p>
             <a:fld id="{6D7BF124-89DF-4EBC-BCA2-D0D0B8B9CCE7}" type="datetimeFigureOut">
               <a:rPr lang="ru-RU" smtClean="0"/>
-              <a:t>21.01.2022</a:t>
+              <a:t>26.01.2022</a:t>
             </a:fld>
             <a:endParaRPr lang="ru-RU"/>
           </a:p>
@@ -891,7 +891,7 @@
           <a:p>
             <a:fld id="{6D7BF124-89DF-4EBC-BCA2-D0D0B8B9CCE7}" type="datetimeFigureOut">
               <a:rPr lang="ru-RU" smtClean="0"/>
-              <a:t>21.01.2022</a:t>
+              <a:t>26.01.2022</a:t>
             </a:fld>
             <a:endParaRPr lang="ru-RU"/>
           </a:p>
@@ -1145,7 +1145,7 @@
           <a:p>
             <a:fld id="{6D7BF124-89DF-4EBC-BCA2-D0D0B8B9CCE7}" type="datetimeFigureOut">
               <a:rPr lang="ru-RU" smtClean="0"/>
-              <a:t>21.01.2022</a:t>
+              <a:t>26.01.2022</a:t>
             </a:fld>
             <a:endParaRPr lang="ru-RU"/>
           </a:p>
@@ -1471,7 +1471,7 @@
           <a:p>
             <a:fld id="{6D7BF124-89DF-4EBC-BCA2-D0D0B8B9CCE7}" type="datetimeFigureOut">
               <a:rPr lang="ru-RU" smtClean="0"/>
-              <a:t>21.01.2022</a:t>
+              <a:t>26.01.2022</a:t>
             </a:fld>
             <a:endParaRPr lang="ru-RU"/>
           </a:p>
@@ -1922,7 +1922,7 @@
           <a:p>
             <a:fld id="{6D7BF124-89DF-4EBC-BCA2-D0D0B8B9CCE7}" type="datetimeFigureOut">
               <a:rPr lang="ru-RU" smtClean="0"/>
-              <a:t>21.01.2022</a:t>
+              <a:t>26.01.2022</a:t>
             </a:fld>
             <a:endParaRPr lang="ru-RU"/>
           </a:p>
@@ -2040,7 +2040,7 @@
           <a:p>
             <a:fld id="{6D7BF124-89DF-4EBC-BCA2-D0D0B8B9CCE7}" type="datetimeFigureOut">
               <a:rPr lang="ru-RU" smtClean="0"/>
-              <a:t>21.01.2022</a:t>
+              <a:t>26.01.2022</a:t>
             </a:fld>
             <a:endParaRPr lang="ru-RU"/>
           </a:p>
@@ -2135,7 +2135,7 @@
           <a:p>
             <a:fld id="{6D7BF124-89DF-4EBC-BCA2-D0D0B8B9CCE7}" type="datetimeFigureOut">
               <a:rPr lang="ru-RU" smtClean="0"/>
-              <a:t>21.01.2022</a:t>
+              <a:t>26.01.2022</a:t>
             </a:fld>
             <a:endParaRPr lang="ru-RU"/>
           </a:p>
@@ -2422,7 +2422,7 @@
           <a:p>
             <a:fld id="{6D7BF124-89DF-4EBC-BCA2-D0D0B8B9CCE7}" type="datetimeFigureOut">
               <a:rPr lang="ru-RU" smtClean="0"/>
-              <a:t>21.01.2022</a:t>
+              <a:t>26.01.2022</a:t>
             </a:fld>
             <a:endParaRPr lang="ru-RU"/>
           </a:p>
@@ -2744,7 +2744,7 @@
           <a:p>
             <a:fld id="{6D7BF124-89DF-4EBC-BCA2-D0D0B8B9CCE7}" type="datetimeFigureOut">
               <a:rPr lang="ru-RU" smtClean="0"/>
-              <a:t>21.01.2022</a:t>
+              <a:t>26.01.2022</a:t>
             </a:fld>
             <a:endParaRPr lang="ru-RU"/>
           </a:p>
@@ -2998,7 +2998,7 @@
           <a:p>
             <a:fld id="{6D7BF124-89DF-4EBC-BCA2-D0D0B8B9CCE7}" type="datetimeFigureOut">
               <a:rPr lang="ru-RU" smtClean="0"/>
-              <a:t>21.01.2022</a:t>
+              <a:t>26.01.2022</a:t>
             </a:fld>
             <a:endParaRPr lang="ru-RU"/>
           </a:p>
@@ -3716,10 +3716,10 @@
       </p:sp>
       <p:pic>
         <p:nvPicPr>
-          <p:cNvPr id="6" name="Рисунок 5">
+          <p:cNvPr id="4" name="Рисунок 3">
             <a:extLst>
               <a:ext uri="{FF2B5EF4-FFF2-40B4-BE49-F238E27FC236}">
-                <a16:creationId xmlns:a16="http://schemas.microsoft.com/office/drawing/2014/main" id="{133224EA-D135-44C3-A33B-DC1EA6295310}"/>
+                <a16:creationId xmlns:a16="http://schemas.microsoft.com/office/drawing/2014/main" id="{BBB3266E-7F85-4C89-9090-A8374B87B783}"/>
               </a:ext>
             </a:extLst>
           </p:cNvPr>
@@ -3742,8 +3742,8 @@
         </p:blipFill>
         <p:spPr>
           <a:xfrm>
-            <a:off x="244066" y="1813237"/>
-            <a:ext cx="10710446" cy="4268780"/>
+            <a:off x="149824" y="1691322"/>
+            <a:ext cx="10804687" cy="5047600"/>
           </a:xfrm>
           <a:prstGeom prst="rect">
             <a:avLst/>

</xml_diff>

<commit_message>
pitch presentation and popup menu for dishwasher
</commit_message>
<xml_diff>
--- a/Documentation/Pitch.pptx
+++ b/Documentation/Pitch.pptx
@@ -3802,7 +3802,7 @@
           <a:lstStyle/>
           <a:p>
             <a:r>
-              <a:rPr lang="en-US" dirty="0"/>
+              <a:rPr lang="en-US"/>
               <a:t>UI</a:t>
             </a:r>
             <a:endParaRPr lang="ru-RU" dirty="0"/>
@@ -3811,10 +3811,10 @@
       </p:sp>
       <p:pic>
         <p:nvPicPr>
-          <p:cNvPr id="9" name="Рисунок 8">
+          <p:cNvPr id="6" name="Рисунок 5">
             <a:extLst>
               <a:ext uri="{FF2B5EF4-FFF2-40B4-BE49-F238E27FC236}">
-                <a16:creationId xmlns:a16="http://schemas.microsoft.com/office/drawing/2014/main" id="{CEC31EC9-764F-484E-91C5-5DC974C93471}"/>
+                <a16:creationId xmlns:a16="http://schemas.microsoft.com/office/drawing/2014/main" id="{6AA90A33-8D1C-4291-8FA1-D5575A0F85EE}"/>
               </a:ext>
             </a:extLst>
           </p:cNvPr>
@@ -3823,16 +3823,15 @@
           </p:cNvPicPr>
           <p:nvPr/>
         </p:nvPicPr>
-        <p:blipFill>
+        <p:blipFill rotWithShape="1">
           <a:blip r:embed="rId2"/>
-          <a:stretch>
-            <a:fillRect/>
-          </a:stretch>
+          <a:srcRect t="3596"/>
+          <a:stretch/>
         </p:blipFill>
         <p:spPr>
           <a:xfrm>
-            <a:off x="1567681" y="1691322"/>
-            <a:ext cx="2220800" cy="4767538"/>
+            <a:off x="4223439" y="1748141"/>
+            <a:ext cx="2323528" cy="4851408"/>
           </a:xfrm>
           <a:prstGeom prst="rect">
             <a:avLst/>
@@ -3841,10 +3840,10 @@
       </p:pic>
       <p:pic>
         <p:nvPicPr>
-          <p:cNvPr id="11" name="Рисунок 10">
+          <p:cNvPr id="8" name="Рисунок 7">
             <a:extLst>
               <a:ext uri="{FF2B5EF4-FFF2-40B4-BE49-F238E27FC236}">
-                <a16:creationId xmlns:a16="http://schemas.microsoft.com/office/drawing/2014/main" id="{A1F879A0-E625-466E-887A-67C4581D830F}"/>
+                <a16:creationId xmlns:a16="http://schemas.microsoft.com/office/drawing/2014/main" id="{568EABAA-D0CF-48B2-9242-DA53C40F9AA3}"/>
               </a:ext>
             </a:extLst>
           </p:cNvPr>
@@ -3853,16 +3852,15 @@
           </p:cNvPicPr>
           <p:nvPr/>
         </p:nvPicPr>
-        <p:blipFill>
+        <p:blipFill rotWithShape="1">
           <a:blip r:embed="rId3"/>
-          <a:stretch>
-            <a:fillRect/>
-          </a:stretch>
+          <a:srcRect t="4027"/>
+          <a:stretch/>
         </p:blipFill>
         <p:spPr>
           <a:xfrm>
-            <a:off x="7703492" y="1691322"/>
-            <a:ext cx="2236003" cy="4767538"/>
+            <a:off x="7596051" y="1737634"/>
+            <a:ext cx="2338992" cy="4861915"/>
           </a:xfrm>
           <a:prstGeom prst="rect">
             <a:avLst/>
@@ -3871,10 +3869,10 @@
       </p:pic>
       <p:pic>
         <p:nvPicPr>
-          <p:cNvPr id="15" name="Рисунок 14">
+          <p:cNvPr id="12" name="Рисунок 11">
             <a:extLst>
               <a:ext uri="{FF2B5EF4-FFF2-40B4-BE49-F238E27FC236}">
-                <a16:creationId xmlns:a16="http://schemas.microsoft.com/office/drawing/2014/main" id="{421B699F-AF00-48FA-967B-D94452D2BC7E}"/>
+                <a16:creationId xmlns:a16="http://schemas.microsoft.com/office/drawing/2014/main" id="{8F88B7D2-CDF0-4E2F-9993-222C413E47E1}"/>
               </a:ext>
             </a:extLst>
           </p:cNvPr>
@@ -3883,16 +3881,15 @@
           </p:cNvPicPr>
           <p:nvPr/>
         </p:nvPicPr>
-        <p:blipFill>
+        <p:blipFill rotWithShape="1">
           <a:blip r:embed="rId4"/>
-          <a:stretch>
-            <a:fillRect/>
-          </a:stretch>
+          <a:srcRect t="3596"/>
+          <a:stretch/>
         </p:blipFill>
         <p:spPr>
           <a:xfrm>
-            <a:off x="4627985" y="1691322"/>
-            <a:ext cx="2236003" cy="4872906"/>
+            <a:off x="850827" y="1748141"/>
+            <a:ext cx="2323528" cy="4851408"/>
           </a:xfrm>
           <a:prstGeom prst="rect">
             <a:avLst/>

</xml_diff>